<commit_message>
Update share of inflow workbooks
</commit_message>
<xml_diff>
--- a/ProtectPowell/ProtectLakePowell.pptx
+++ b/ProtectPowell/ProtectLakePowell.pptx
@@ -260,7 +260,7 @@
           <a:p>
             <a:fld id="{DADD071D-6307-46EF-8484-8AD6D8EF0DAB}" type="datetimeFigureOut">
               <a:rPr lang="en-US" smtClean="0"/>
-              <a:t>4/5/2022</a:t>
+              <a:t>4/6/2022</a:t>
             </a:fld>
             <a:endParaRPr lang="en-US"/>
           </a:p>
@@ -458,7 +458,7 @@
           <a:p>
             <a:fld id="{DADD071D-6307-46EF-8484-8AD6D8EF0DAB}" type="datetimeFigureOut">
               <a:rPr lang="en-US" smtClean="0"/>
-              <a:t>4/5/2022</a:t>
+              <a:t>4/6/2022</a:t>
             </a:fld>
             <a:endParaRPr lang="en-US"/>
           </a:p>
@@ -666,7 +666,7 @@
           <a:p>
             <a:fld id="{DADD071D-6307-46EF-8484-8AD6D8EF0DAB}" type="datetimeFigureOut">
               <a:rPr lang="en-US" smtClean="0"/>
-              <a:t>4/5/2022</a:t>
+              <a:t>4/6/2022</a:t>
             </a:fld>
             <a:endParaRPr lang="en-US"/>
           </a:p>
@@ -864,7 +864,7 @@
           <a:p>
             <a:fld id="{DADD071D-6307-46EF-8484-8AD6D8EF0DAB}" type="datetimeFigureOut">
               <a:rPr lang="en-US" smtClean="0"/>
-              <a:t>4/5/2022</a:t>
+              <a:t>4/6/2022</a:t>
             </a:fld>
             <a:endParaRPr lang="en-US"/>
           </a:p>
@@ -1139,7 +1139,7 @@
           <a:p>
             <a:fld id="{DADD071D-6307-46EF-8484-8AD6D8EF0DAB}" type="datetimeFigureOut">
               <a:rPr lang="en-US" smtClean="0"/>
-              <a:t>4/5/2022</a:t>
+              <a:t>4/6/2022</a:t>
             </a:fld>
             <a:endParaRPr lang="en-US"/>
           </a:p>
@@ -1404,7 +1404,7 @@
           <a:p>
             <a:fld id="{DADD071D-6307-46EF-8484-8AD6D8EF0DAB}" type="datetimeFigureOut">
               <a:rPr lang="en-US" smtClean="0"/>
-              <a:t>4/5/2022</a:t>
+              <a:t>4/6/2022</a:t>
             </a:fld>
             <a:endParaRPr lang="en-US"/>
           </a:p>
@@ -1816,7 +1816,7 @@
           <a:p>
             <a:fld id="{DADD071D-6307-46EF-8484-8AD6D8EF0DAB}" type="datetimeFigureOut">
               <a:rPr lang="en-US" smtClean="0"/>
-              <a:t>4/5/2022</a:t>
+              <a:t>4/6/2022</a:t>
             </a:fld>
             <a:endParaRPr lang="en-US"/>
           </a:p>
@@ -1957,7 +1957,7 @@
           <a:p>
             <a:fld id="{DADD071D-6307-46EF-8484-8AD6D8EF0DAB}" type="datetimeFigureOut">
               <a:rPr lang="en-US" smtClean="0"/>
-              <a:t>4/5/2022</a:t>
+              <a:t>4/6/2022</a:t>
             </a:fld>
             <a:endParaRPr lang="en-US"/>
           </a:p>
@@ -2070,7 +2070,7 @@
           <a:p>
             <a:fld id="{DADD071D-6307-46EF-8484-8AD6D8EF0DAB}" type="datetimeFigureOut">
               <a:rPr lang="en-US" smtClean="0"/>
-              <a:t>4/5/2022</a:t>
+              <a:t>4/6/2022</a:t>
             </a:fld>
             <a:endParaRPr lang="en-US"/>
           </a:p>
@@ -2381,7 +2381,7 @@
           <a:p>
             <a:fld id="{DADD071D-6307-46EF-8484-8AD6D8EF0DAB}" type="datetimeFigureOut">
               <a:rPr lang="en-US" smtClean="0"/>
-              <a:t>4/5/2022</a:t>
+              <a:t>4/6/2022</a:t>
             </a:fld>
             <a:endParaRPr lang="en-US"/>
           </a:p>
@@ -2669,7 +2669,7 @@
           <a:p>
             <a:fld id="{DADD071D-6307-46EF-8484-8AD6D8EF0DAB}" type="datetimeFigureOut">
               <a:rPr lang="en-US" smtClean="0"/>
-              <a:t>4/5/2022</a:t>
+              <a:t>4/6/2022</a:t>
             </a:fld>
             <a:endParaRPr lang="en-US"/>
           </a:p>
@@ -2910,7 +2910,7 @@
           <a:p>
             <a:fld id="{DADD071D-6307-46EF-8484-8AD6D8EF0DAB}" type="datetimeFigureOut">
               <a:rPr lang="en-US" smtClean="0"/>
-              <a:t>4/5/2022</a:t>
+              <a:t>4/6/2022</a:t>
             </a:fld>
             <a:endParaRPr lang="en-US"/>
           </a:p>
@@ -3497,8 +3497,8 @@
         </p:nvSpPr>
         <p:spPr>
           <a:xfrm>
-            <a:off x="8743243" y="5284894"/>
-            <a:ext cx="3366583" cy="1323439"/>
+            <a:off x="8279309" y="5284894"/>
+            <a:ext cx="3830518" cy="1323439"/>
           </a:xfrm>
           <a:prstGeom prst="rect">
             <a:avLst/>
@@ -3519,6 +3519,33 @@
                 </a:solidFill>
               </a:rPr>
               <a:t>Drought Response Operations</a:t>
+            </a:r>
+          </a:p>
+          <a:p>
+            <a:pPr algn="ctr"/>
+            <a:r>
+              <a:rPr lang="en-US" sz="2000">
+                <a:solidFill>
+                  <a:srgbClr val="7030A0"/>
+                </a:solidFill>
+              </a:rPr>
+              <a:t>&lt; 1 </a:t>
+            </a:r>
+            <a:r>
+              <a:rPr lang="en-US" sz="2000" dirty="0" err="1">
+                <a:solidFill>
+                  <a:srgbClr val="7030A0"/>
+                </a:solidFill>
+              </a:rPr>
+              <a:t>maf</a:t>
+            </a:r>
+            <a:r>
+              <a:rPr lang="en-US" sz="2000" dirty="0">
+                <a:solidFill>
+                  <a:srgbClr val="7030A0"/>
+                </a:solidFill>
+              </a:rPr>
+              <a:t> movable</a:t>
             </a:r>
           </a:p>
           <a:p>

</xml_diff>

<commit_message>
Update main README with new folders
</commit_message>
<xml_diff>
--- a/ProtectPowell/ProtectLakePowell.pptx
+++ b/ProtectPowell/ProtectLakePowell.pptx
@@ -3653,8 +3653,8 @@
         </p:nvSpPr>
         <p:spPr>
           <a:xfrm>
-            <a:off x="952205" y="2896656"/>
-            <a:ext cx="2678810" cy="707886"/>
+            <a:off x="1093109" y="2896656"/>
+            <a:ext cx="2397002" cy="1015663"/>
           </a:xfrm>
           <a:prstGeom prst="rect">
             <a:avLst/>
@@ -3674,7 +3674,7 @@
                   <a:srgbClr val="0000FF"/>
                 </a:solidFill>
               </a:rPr>
-              <a:t>Release by Equalization</a:t>
+              <a:t>Release</a:t>
             </a:r>
           </a:p>
           <a:p>
@@ -3685,7 +3685,7 @@
                   <a:srgbClr val="0000FF"/>
                 </a:solidFill>
               </a:rPr>
-              <a:t>(7 – 7.48 </a:t>
+              <a:t>7 – 7.48 </a:t>
             </a:r>
             <a:r>
               <a:rPr lang="en-US" sz="2000" dirty="0" err="1">
@@ -3701,8 +3701,40 @@
                   <a:srgbClr val="0000FF"/>
                 </a:solidFill>
               </a:rPr>
-              <a:t> per year)</a:t>
-            </a:r>
+              <a:t> per year</a:t>
+            </a:r>
+          </a:p>
+          <a:p>
+            <a:pPr algn="ctr"/>
+            <a:r>
+              <a:rPr lang="en-US" sz="2000">
+                <a:solidFill>
+                  <a:srgbClr val="0000FF"/>
+                </a:solidFill>
+              </a:rPr>
+              <a:t>(Lower </a:t>
+            </a:r>
+            <a:r>
+              <a:rPr lang="en-US" sz="2000" dirty="0">
+                <a:solidFill>
+                  <a:srgbClr val="0000FF"/>
+                </a:solidFill>
+              </a:rPr>
+              <a:t>– </a:t>
+            </a:r>
+            <a:r>
+              <a:rPr lang="en-US" sz="2000">
+                <a:solidFill>
+                  <a:srgbClr val="0000FF"/>
+                </a:solidFill>
+              </a:rPr>
+              <a:t>Mid tier)</a:t>
+            </a:r>
+            <a:endParaRPr lang="en-US" sz="2000" dirty="0">
+              <a:solidFill>
+                <a:srgbClr val="0000FF"/>
+              </a:solidFill>
+            </a:endParaRPr>
           </a:p>
         </p:txBody>
       </p:sp>
@@ -3990,8 +4022,8 @@
         </p:nvCxnSpPr>
         <p:spPr>
           <a:xfrm flipH="1" flipV="1">
-            <a:off x="3631015" y="3250599"/>
-            <a:ext cx="993075" cy="955981"/>
+            <a:off x="3490111" y="3404488"/>
+            <a:ext cx="1133979" cy="802092"/>
           </a:xfrm>
           <a:prstGeom prst="straightConnector1">
             <a:avLst/>

</xml_diff>